<commit_message>
aggiornati schemi e alimentazione
</commit_message>
<xml_diff>
--- a/images/Schema.pptx
+++ b/images/Schema.pptx
@@ -8,6 +8,7 @@
     <p:sldId id="256" r:id="rId3"/>
     <p:sldId id="257" r:id="rId4"/>
     <p:sldId id="258" r:id="rId5"/>
+    <p:sldId id="259" r:id="rId6"/>
   </p:sldIdLst>
   <p:sldSz cx="12192000" cy="6858000"/>
   <p:notesSz cx="12192000" cy="6858000"/>
@@ -3233,7 +3234,7 @@
           <a:stretch/>
         </p:blipFill>
         <p:spPr bwMode="auto">
-          <a:xfrm rot="10799990" flipH="1" flipV="1">
+          <a:xfrm rot="10799989" flipH="1" flipV="1">
             <a:off x="1247959" y="502143"/>
             <a:ext cx="4254345" cy="2836230"/>
           </a:xfrm>
@@ -3476,7 +3477,7 @@
           <p:nvPr isPhoto="0" userDrawn="0"/>
         </p:nvCxnSpPr>
         <p:spPr bwMode="auto">
-          <a:xfrm rot="5399978" flipH="1" flipV="0">
+          <a:xfrm rot="5399977" flipH="1" flipV="0">
             <a:off x="6365247" y="1818856"/>
             <a:ext cx="198129" cy="0"/>
           </a:xfrm>
@@ -3520,7 +3521,7 @@
           <p:nvPr isPhoto="0" userDrawn="0"/>
         </p:nvCxnSpPr>
         <p:spPr bwMode="auto">
-          <a:xfrm rot="10799990" flipH="1" flipV="0">
+          <a:xfrm rot="10799989" flipH="1" flipV="0">
             <a:off x="6464312" y="1717145"/>
             <a:ext cx="1590145" cy="0"/>
           </a:xfrm>
@@ -3564,8 +3565,8 @@
           <p:nvPr isPhoto="0" userDrawn="0"/>
         </p:nvCxnSpPr>
         <p:spPr bwMode="auto">
-          <a:xfrm rot="5399978" flipH="0" flipV="1">
-            <a:off x="7825593" y="1948656"/>
+          <a:xfrm rot="5399977" flipH="0" flipV="1">
+            <a:off x="7825592" y="1948656"/>
             <a:ext cx="463020" cy="0"/>
           </a:xfrm>
           <a:prstGeom prst="line">
@@ -3697,7 +3698,7 @@
         </p:nvCxnSpPr>
         <p:spPr bwMode="auto">
           <a:xfrm flipH="0" flipV="0">
-            <a:off x="5482708" y="1571624"/>
+            <a:off x="5482708" y="1571623"/>
             <a:ext cx="1010708" cy="4085166"/>
           </a:xfrm>
           <a:prstGeom prst="bentConnector5">
@@ -3940,7 +3941,7 @@
           <a:stretch/>
         </p:blipFill>
         <p:spPr bwMode="auto">
-          <a:xfrm rot="10799990" flipH="1" flipV="1">
+          <a:xfrm rot="10799989" flipH="1" flipV="1">
             <a:off x="1247958" y="502142"/>
             <a:ext cx="4254345" cy="2836229"/>
           </a:xfrm>
@@ -3964,7 +3965,7 @@
         <p:spPr bwMode="auto">
           <a:xfrm flipH="0" flipV="0">
             <a:off x="3506771" y="3245897"/>
-            <a:ext cx="1475200" cy="2684199"/>
+            <a:ext cx="1475199" cy="2684199"/>
           </a:xfrm>
           <a:prstGeom prst="rect">
             <a:avLst/>
@@ -4207,7 +4208,7 @@
         </p:nvCxnSpPr>
         <p:spPr bwMode="auto">
           <a:xfrm rot="0" flipH="0" flipV="1">
-            <a:off x="5502304" y="1917919"/>
+            <a:off x="5502303" y="1917919"/>
             <a:ext cx="964651" cy="0"/>
           </a:xfrm>
           <a:prstGeom prst="line">
@@ -4250,7 +4251,7 @@
           <p:nvPr isPhoto="0" userDrawn="0"/>
         </p:nvCxnSpPr>
         <p:spPr bwMode="auto">
-          <a:xfrm rot="5399978" flipH="1" flipV="0">
+          <a:xfrm rot="5399977" flipH="1" flipV="0">
             <a:off x="6365247" y="1818855"/>
             <a:ext cx="198128" cy="0"/>
           </a:xfrm>
@@ -4294,7 +4295,7 @@
           <p:nvPr isPhoto="0" userDrawn="0"/>
         </p:nvCxnSpPr>
         <p:spPr bwMode="auto">
-          <a:xfrm rot="10799990" flipH="1" flipV="0">
+          <a:xfrm rot="10799989" flipH="1" flipV="0">
             <a:off x="6464311" y="1717144"/>
             <a:ext cx="1590144" cy="0"/>
           </a:xfrm>
@@ -4338,7 +4339,7 @@
           <p:nvPr isPhoto="0" userDrawn="0"/>
         </p:nvCxnSpPr>
         <p:spPr bwMode="auto">
-          <a:xfrm rot="5399978" flipH="0" flipV="1">
+          <a:xfrm rot="5399977" flipH="0" flipV="1">
             <a:off x="7825592" y="1948655"/>
             <a:ext cx="463019" cy="0"/>
           </a:xfrm>
@@ -4426,7 +4427,7 @@
         </p:nvCxnSpPr>
         <p:spPr bwMode="auto">
           <a:xfrm flipH="0" flipV="0">
-            <a:off x="5461540" y="1740957"/>
+            <a:off x="5461540" y="1740956"/>
             <a:ext cx="439207" cy="4132791"/>
           </a:xfrm>
           <a:prstGeom prst="bentConnector5">
@@ -4714,7 +4715,7 @@
           <a:stretch/>
         </p:blipFill>
         <p:spPr bwMode="auto">
-          <a:xfrm rot="10799990" flipH="1" flipV="1">
+          <a:xfrm rot="10799989" flipH="1" flipV="1">
             <a:off x="1247958" y="502142"/>
             <a:ext cx="4254345" cy="2836229"/>
           </a:xfrm>
@@ -4738,7 +4739,7 @@
         <p:spPr bwMode="auto">
           <a:xfrm flipH="0" flipV="0">
             <a:off x="3506771" y="3245897"/>
-            <a:ext cx="1475200" cy="2684199"/>
+            <a:ext cx="1475199" cy="2684199"/>
           </a:xfrm>
           <a:prstGeom prst="rect">
             <a:avLst/>
@@ -4981,7 +4982,7 @@
         </p:nvCxnSpPr>
         <p:spPr bwMode="auto">
           <a:xfrm rot="0" flipH="0" flipV="1">
-            <a:off x="5502304" y="1917919"/>
+            <a:off x="5502303" y="1917919"/>
             <a:ext cx="964651" cy="0"/>
           </a:xfrm>
           <a:prstGeom prst="line">
@@ -5024,7 +5025,7 @@
           <p:nvPr isPhoto="0" userDrawn="0"/>
         </p:nvCxnSpPr>
         <p:spPr bwMode="auto">
-          <a:xfrm rot="5399978" flipH="1" flipV="0">
+          <a:xfrm rot="5399977" flipH="1" flipV="0">
             <a:off x="6365247" y="1818855"/>
             <a:ext cx="198128" cy="0"/>
           </a:xfrm>
@@ -5068,7 +5069,7 @@
           <p:nvPr isPhoto="0" userDrawn="0"/>
         </p:nvCxnSpPr>
         <p:spPr bwMode="auto">
-          <a:xfrm rot="10799990" flipH="1" flipV="0">
+          <a:xfrm rot="10799989" flipH="1" flipV="0">
             <a:off x="6464311" y="1717144"/>
             <a:ext cx="1590144" cy="0"/>
           </a:xfrm>
@@ -5112,7 +5113,7 @@
           <p:nvPr isPhoto="0" userDrawn="0"/>
         </p:nvCxnSpPr>
         <p:spPr bwMode="auto">
-          <a:xfrm rot="5399978" flipH="0" flipV="1">
+          <a:xfrm rot="5399977" flipH="0" flipV="1">
             <a:off x="7825592" y="1948655"/>
             <a:ext cx="463019" cy="0"/>
           </a:xfrm>
@@ -5200,7 +5201,7 @@
         </p:nvCxnSpPr>
         <p:spPr bwMode="auto">
           <a:xfrm flipH="0" flipV="0">
-            <a:off x="5461540" y="1740957"/>
+            <a:off x="5461540" y="1740956"/>
             <a:ext cx="439207" cy="4132791"/>
           </a:xfrm>
           <a:prstGeom prst="bentConnector5">
@@ -5498,7 +5499,7 @@
         </p:nvCxnSpPr>
         <p:spPr bwMode="auto">
           <a:xfrm flipH="0" flipV="1">
-            <a:off x="7516199" y="1171575"/>
+            <a:off x="7506767" y="1171575"/>
             <a:ext cx="0" cy="4476749"/>
           </a:xfrm>
           <a:prstGeom prst="line">
@@ -5621,6 +5622,1006 @@
           </a:prstGeom>
           <a:solidFill>
             <a:srgbClr val="FF0000"/>
+          </a:solidFill>
+        </p:spPr>
+        <p:style>
+          <a:lnRef idx="2">
+            <a:schemeClr val="accent1">
+              <a:shade val="50000"/>
+            </a:schemeClr>
+          </a:lnRef>
+          <a:fillRef idx="1">
+            <a:schemeClr val="accent1"/>
+          </a:fillRef>
+          <a:effectRef idx="0">
+            <a:schemeClr val="accent1"/>
+          </a:effectRef>
+          <a:fontRef idx="minor">
+            <a:schemeClr val="lt1"/>
+          </a:fontRef>
+        </p:style>
+      </p:sp>
+      <p:pic>
+        <p:nvPicPr>
+          <p:cNvPr id="29" name="" hidden="0"/>
+          <p:cNvPicPr>
+            <a:picLocks noChangeAspect="1"/>
+          </p:cNvPicPr>
+          <p:nvPr isPhoto="0" userDrawn="0"/>
+        </p:nvPicPr>
+        <p:blipFill>
+          <a:blip r:embed="rId6"/>
+          <a:stretch/>
+        </p:blipFill>
+        <p:spPr bwMode="auto">
+          <a:xfrm flipH="0" flipV="0">
+            <a:off x="10381543" y="660592"/>
+            <a:ext cx="715063" cy="214090"/>
+          </a:xfrm>
+          <a:prstGeom prst="rect">
+            <a:avLst/>
+          </a:prstGeom>
+        </p:spPr>
+      </p:pic>
+      <p:pic>
+        <p:nvPicPr>
+          <p:cNvPr id="30" name="" hidden="0"/>
+          <p:cNvPicPr>
+            <a:picLocks noChangeAspect="1"/>
+          </p:cNvPicPr>
+          <p:nvPr isPhoto="0" userDrawn="0"/>
+        </p:nvPicPr>
+        <p:blipFill>
+          <a:blip r:embed="rId6"/>
+          <a:stretch/>
+        </p:blipFill>
+        <p:spPr bwMode="auto">
+          <a:xfrm rot="5399943" flipH="0" flipV="0">
+            <a:off x="10739076" y="1020646"/>
+            <a:ext cx="715062" cy="214090"/>
+          </a:xfrm>
+          <a:prstGeom prst="rect">
+            <a:avLst/>
+          </a:prstGeom>
+        </p:spPr>
+      </p:pic>
+      <p:cxnSp>
+        <p:nvCxnSpPr>
+          <p:cNvPr id="31" name="" hidden="0"/>
+          <p:cNvCxnSpPr>
+            <a:cxnSpLocks/>
+          </p:cNvCxnSpPr>
+          <p:nvPr isPhoto="0" userDrawn="0"/>
+        </p:nvCxnSpPr>
+        <p:spPr bwMode="auto">
+          <a:xfrm flipH="1" flipV="1">
+            <a:off x="11102408" y="1496625"/>
+            <a:ext cx="0" cy="833762"/>
+          </a:xfrm>
+          <a:prstGeom prst="line">
+            <a:avLst/>
+          </a:prstGeom>
+          <a:ln w="38099" cap="flat" cmpd="sng" algn="ctr">
+            <a:solidFill>
+              <a:srgbClr val="002060"/>
+            </a:solidFill>
+            <a:prstDash val="solid"/>
+            <a:miter/>
+          </a:ln>
+        </p:spPr>
+        <p:style>
+          <a:lnRef idx="1">
+            <a:schemeClr val="accent1">
+              <a:shade val="50000"/>
+            </a:schemeClr>
+          </a:lnRef>
+          <a:fillRef idx="0">
+            <a:schemeClr val="accent1"/>
+          </a:fillRef>
+          <a:effectRef idx="0">
+            <a:schemeClr val="accent1"/>
+          </a:effectRef>
+          <a:fontRef idx="minor">
+            <a:schemeClr val="tx1"/>
+          </a:fontRef>
+        </p:style>
+      </p:cxnSp>
+      <p:sp>
+        <p:nvSpPr>
+          <p:cNvPr id="32" name="" hidden="0"/>
+          <p:cNvSpPr/>
+          <p:nvPr isPhoto="0" userDrawn="0"/>
+        </p:nvSpPr>
+        <p:spPr bwMode="auto">
+          <a:xfrm flipH="0" flipV="0">
+            <a:off x="11041046" y="2231568"/>
+            <a:ext cx="111123" cy="126999"/>
+          </a:xfrm>
+          <a:prstGeom prst="ellipse">
+            <a:avLst/>
+          </a:prstGeom>
+          <a:solidFill>
+            <a:srgbClr val="002060"/>
+          </a:solidFill>
+        </p:spPr>
+        <p:style>
+          <a:lnRef idx="2">
+            <a:schemeClr val="accent1">
+              <a:shade val="50000"/>
+            </a:schemeClr>
+          </a:lnRef>
+          <a:fillRef idx="1">
+            <a:schemeClr val="accent1"/>
+          </a:fillRef>
+          <a:effectRef idx="0">
+            <a:schemeClr val="accent1"/>
+          </a:effectRef>
+          <a:fontRef idx="minor">
+            <a:schemeClr val="lt1"/>
+          </a:fontRef>
+        </p:style>
+      </p:sp>
+      <p:pic>
+        <p:nvPicPr>
+          <p:cNvPr id="33" name="" hidden="0"/>
+          <p:cNvPicPr>
+            <a:picLocks noChangeAspect="1"/>
+          </p:cNvPicPr>
+          <p:nvPr isPhoto="0" userDrawn="0"/>
+        </p:nvPicPr>
+        <p:blipFill>
+          <a:blip r:embed="rId6"/>
+          <a:stretch/>
+        </p:blipFill>
+        <p:spPr bwMode="auto">
+          <a:xfrm rot="5399943" flipH="0" flipV="0">
+            <a:off x="8057279" y="3193826"/>
+            <a:ext cx="715062" cy="214089"/>
+          </a:xfrm>
+          <a:prstGeom prst="rect">
+            <a:avLst/>
+          </a:prstGeom>
+        </p:spPr>
+      </p:pic>
+      <p:cxnSp>
+        <p:nvCxnSpPr>
+          <p:cNvPr id="34" name="" hidden="0"/>
+          <p:cNvCxnSpPr>
+            <a:cxnSpLocks/>
+            <a:endCxn id="33" idx="3"/>
+          </p:cNvCxnSpPr>
+          <p:nvPr isPhoto="0" userDrawn="0"/>
+        </p:nvCxnSpPr>
+        <p:spPr bwMode="auto">
+          <a:xfrm rot="16199969" flipH="0" flipV="0">
+            <a:off x="7396474" y="4631927"/>
+            <a:ext cx="1991863" cy="44813"/>
+          </a:xfrm>
+          <a:prstGeom prst="line">
+            <a:avLst/>
+          </a:prstGeom>
+          <a:ln w="38099" cap="flat" cmpd="sng" algn="ctr">
+            <a:solidFill>
+              <a:srgbClr val="FF0000"/>
+            </a:solidFill>
+            <a:prstDash val="solid"/>
+            <a:miter/>
+          </a:ln>
+        </p:spPr>
+        <p:style>
+          <a:lnRef idx="1">
+            <a:schemeClr val="accent1">
+              <a:shade val="50000"/>
+            </a:schemeClr>
+          </a:lnRef>
+          <a:fillRef idx="0">
+            <a:schemeClr val="accent1"/>
+          </a:fillRef>
+          <a:effectRef idx="0">
+            <a:schemeClr val="accent1"/>
+          </a:effectRef>
+          <a:fontRef idx="minor">
+            <a:schemeClr val="tx1"/>
+          </a:fontRef>
+        </p:style>
+      </p:cxnSp>
+      <p:cxnSp>
+        <p:nvCxnSpPr>
+          <p:cNvPr id="35" name="" hidden="0"/>
+          <p:cNvCxnSpPr>
+            <a:cxnSpLocks/>
+          </p:cNvCxnSpPr>
+          <p:nvPr isPhoto="0" userDrawn="0"/>
+        </p:nvCxnSpPr>
+        <p:spPr bwMode="auto">
+          <a:xfrm rot="16199969" flipH="0" flipV="1">
+            <a:off x="8342897" y="2893849"/>
+            <a:ext cx="0" cy="149240"/>
+          </a:xfrm>
+          <a:prstGeom prst="line">
+            <a:avLst/>
+          </a:prstGeom>
+          <a:ln w="38099" cap="flat" cmpd="sng" algn="ctr">
+            <a:solidFill>
+              <a:schemeClr val="accent2">
+                <a:lumMod val="50196"/>
+              </a:schemeClr>
+            </a:solidFill>
+            <a:prstDash val="solid"/>
+            <a:miter/>
+          </a:ln>
+        </p:spPr>
+        <p:style>
+          <a:lnRef idx="1">
+            <a:schemeClr val="accent1">
+              <a:shade val="50000"/>
+            </a:schemeClr>
+          </a:lnRef>
+          <a:fillRef idx="0">
+            <a:schemeClr val="accent1"/>
+          </a:fillRef>
+          <a:effectRef idx="0">
+            <a:schemeClr val="accent1"/>
+          </a:effectRef>
+          <a:fontRef idx="minor">
+            <a:schemeClr val="tx1"/>
+          </a:fontRef>
+        </p:style>
+      </p:cxnSp>
+      <p:cxnSp>
+        <p:nvCxnSpPr>
+          <p:cNvPr id="36" name="" hidden="0"/>
+          <p:cNvCxnSpPr>
+            <a:cxnSpLocks/>
+          </p:cNvCxnSpPr>
+          <p:nvPr isPhoto="0" userDrawn="0"/>
+        </p:nvCxnSpPr>
+        <p:spPr bwMode="auto">
+          <a:xfrm rot="16199969" flipH="1" flipV="1">
+            <a:off x="8481610" y="1599188"/>
+            <a:ext cx="0" cy="426667"/>
+          </a:xfrm>
+          <a:prstGeom prst="line">
+            <a:avLst/>
+          </a:prstGeom>
+          <a:ln w="38099" cap="flat" cmpd="sng" algn="ctr">
+            <a:solidFill>
+              <a:schemeClr val="accent2">
+                <a:lumMod val="50196"/>
+              </a:schemeClr>
+            </a:solidFill>
+            <a:prstDash val="solid"/>
+            <a:miter/>
+          </a:ln>
+        </p:spPr>
+        <p:style>
+          <a:lnRef idx="1">
+            <a:schemeClr val="accent1">
+              <a:shade val="50000"/>
+            </a:schemeClr>
+          </a:lnRef>
+          <a:fillRef idx="0">
+            <a:schemeClr val="accent1"/>
+          </a:fillRef>
+          <a:effectRef idx="0">
+            <a:schemeClr val="accent1"/>
+          </a:effectRef>
+          <a:fontRef idx="minor">
+            <a:schemeClr val="tx1"/>
+          </a:fontRef>
+        </p:style>
+      </p:cxnSp>
+      <p:cxnSp>
+        <p:nvCxnSpPr>
+          <p:cNvPr id="37" name="" hidden="0"/>
+          <p:cNvCxnSpPr>
+            <a:cxnSpLocks/>
+            <a:stCxn id="35" idx="1"/>
+          </p:cNvCxnSpPr>
+          <p:nvPr isPhoto="0" userDrawn="0"/>
+        </p:nvCxnSpPr>
+        <p:spPr bwMode="auto">
+          <a:xfrm rot="10799990" flipH="0" flipV="0">
+            <a:off x="8268276" y="1812521"/>
+            <a:ext cx="0" cy="1155948"/>
+          </a:xfrm>
+          <a:prstGeom prst="line">
+            <a:avLst/>
+          </a:prstGeom>
+          <a:ln w="38099" cap="flat" cmpd="sng" algn="ctr">
+            <a:solidFill>
+              <a:schemeClr val="accent2">
+                <a:lumMod val="50196"/>
+              </a:schemeClr>
+            </a:solidFill>
+            <a:prstDash val="solid"/>
+            <a:miter/>
+          </a:ln>
+        </p:spPr>
+        <p:style>
+          <a:lnRef idx="1">
+            <a:schemeClr val="accent1">
+              <a:shade val="50000"/>
+            </a:schemeClr>
+          </a:lnRef>
+          <a:fillRef idx="0">
+            <a:schemeClr val="accent1"/>
+          </a:fillRef>
+          <a:effectRef idx="0">
+            <a:schemeClr val="accent1"/>
+          </a:effectRef>
+          <a:fontRef idx="minor">
+            <a:schemeClr val="tx1"/>
+          </a:fontRef>
+        </p:style>
+      </p:cxnSp>
+      <p:cxnSp>
+        <p:nvCxnSpPr>
+          <p:cNvPr id="38" name="" hidden="0"/>
+          <p:cNvCxnSpPr>
+            <a:cxnSpLocks/>
+          </p:cNvCxnSpPr>
+          <p:nvPr isPhoto="0" userDrawn="0"/>
+        </p:nvCxnSpPr>
+        <p:spPr bwMode="auto">
+          <a:xfrm flipH="0" flipV="1">
+            <a:off x="7149320" y="2940728"/>
+            <a:ext cx="591844" cy="0"/>
+          </a:xfrm>
+          <a:prstGeom prst="line">
+            <a:avLst/>
+          </a:prstGeom>
+          <a:ln w="38099" cap="flat" cmpd="sng" algn="ctr">
+            <a:solidFill>
+              <a:schemeClr val="tx1">
+                <a:lumMod val="94901"/>
+                <a:lumOff val="5099"/>
+              </a:schemeClr>
+            </a:solidFill>
+            <a:prstDash val="solid"/>
+            <a:miter/>
+          </a:ln>
+        </p:spPr>
+        <p:style>
+          <a:lnRef idx="1">
+            <a:schemeClr val="accent1">
+              <a:shade val="50000"/>
+            </a:schemeClr>
+          </a:lnRef>
+          <a:fillRef idx="0">
+            <a:schemeClr val="accent1"/>
+          </a:fillRef>
+          <a:effectRef idx="0">
+            <a:schemeClr val="accent1"/>
+          </a:effectRef>
+          <a:fontRef idx="minor">
+            <a:schemeClr val="tx1"/>
+          </a:fontRef>
+        </p:style>
+      </p:cxnSp>
+      <p:sp>
+        <p:nvSpPr>
+          <p:cNvPr id="39" name="" hidden="0"/>
+          <p:cNvSpPr/>
+          <p:nvPr isPhoto="0" userDrawn="0"/>
+        </p:nvSpPr>
+        <p:spPr bwMode="auto">
+          <a:xfrm flipH="0" flipV="0">
+            <a:off x="7082906" y="2864227"/>
+            <a:ext cx="111123" cy="126999"/>
+          </a:xfrm>
+          <a:prstGeom prst="ellipse">
+            <a:avLst/>
+          </a:prstGeom>
+          <a:solidFill>
+            <a:srgbClr val="002060"/>
+          </a:solidFill>
+        </p:spPr>
+        <p:style>
+          <a:lnRef idx="2">
+            <a:schemeClr val="accent1">
+              <a:shade val="50000"/>
+            </a:schemeClr>
+          </a:lnRef>
+          <a:fillRef idx="1">
+            <a:schemeClr val="accent1"/>
+          </a:fillRef>
+          <a:effectRef idx="0">
+            <a:schemeClr val="accent1"/>
+          </a:effectRef>
+          <a:fontRef idx="minor">
+            <a:schemeClr val="lt1"/>
+          </a:fontRef>
+        </p:style>
+      </p:sp>
+      <p:cxnSp>
+        <p:nvCxnSpPr>
+          <p:cNvPr id="40" name="" hidden="0"/>
+          <p:cNvCxnSpPr>
+            <a:cxnSpLocks/>
+          </p:cNvCxnSpPr>
+          <p:nvPr isPhoto="0" userDrawn="0"/>
+        </p:nvCxnSpPr>
+        <p:spPr bwMode="auto">
+          <a:xfrm flipH="0" flipV="1">
+            <a:off x="7715919" y="2774271"/>
+            <a:ext cx="256434" cy="166456"/>
+          </a:xfrm>
+          <a:prstGeom prst="line">
+            <a:avLst/>
+          </a:prstGeom>
+          <a:ln w="38099" cap="flat" cmpd="sng" algn="ctr">
+            <a:solidFill>
+              <a:schemeClr val="tx1">
+                <a:lumMod val="94901"/>
+                <a:lumOff val="5099"/>
+              </a:schemeClr>
+            </a:solidFill>
+            <a:prstDash val="solid"/>
+            <a:miter/>
+          </a:ln>
+        </p:spPr>
+        <p:style>
+          <a:lnRef idx="1">
+            <a:schemeClr val="accent1">
+              <a:shade val="50000"/>
+            </a:schemeClr>
+          </a:lnRef>
+          <a:fillRef idx="0">
+            <a:schemeClr val="accent1"/>
+          </a:fillRef>
+          <a:effectRef idx="0">
+            <a:schemeClr val="accent1"/>
+          </a:effectRef>
+          <a:fontRef idx="minor">
+            <a:schemeClr val="tx1"/>
+          </a:fontRef>
+        </p:style>
+      </p:cxnSp>
+      <p:cxnSp>
+        <p:nvCxnSpPr>
+          <p:cNvPr id="41" name="" hidden="0"/>
+          <p:cNvCxnSpPr>
+            <a:cxnSpLocks/>
+          </p:cNvCxnSpPr>
+          <p:nvPr isPhoto="0" userDrawn="0"/>
+        </p:nvCxnSpPr>
+        <p:spPr bwMode="auto">
+          <a:xfrm flipH="0" flipV="0">
+            <a:off x="7953859" y="2959222"/>
+            <a:ext cx="297711" cy="0"/>
+          </a:xfrm>
+          <a:prstGeom prst="line">
+            <a:avLst/>
+          </a:prstGeom>
+          <a:ln w="38099" cap="flat" cmpd="sng" algn="ctr">
+            <a:solidFill>
+              <a:schemeClr val="tx1">
+                <a:lumMod val="94901"/>
+                <a:lumOff val="5099"/>
+              </a:schemeClr>
+            </a:solidFill>
+            <a:prstDash val="solid"/>
+            <a:miter/>
+          </a:ln>
+        </p:spPr>
+        <p:style>
+          <a:lnRef idx="1">
+            <a:schemeClr val="accent1">
+              <a:shade val="50000"/>
+            </a:schemeClr>
+          </a:lnRef>
+          <a:fillRef idx="0">
+            <a:schemeClr val="accent1"/>
+          </a:fillRef>
+          <a:effectRef idx="0">
+            <a:schemeClr val="accent1"/>
+          </a:effectRef>
+          <a:fontRef idx="minor">
+            <a:schemeClr val="tx1"/>
+          </a:fontRef>
+        </p:style>
+      </p:cxnSp>
+      <p:sp>
+        <p:nvSpPr>
+          <p:cNvPr id="42" name="" hidden="0"/>
+          <p:cNvSpPr/>
+          <p:nvPr isPhoto="0" userDrawn="0"/>
+        </p:nvSpPr>
+        <p:spPr bwMode="auto">
+          <a:xfrm flipH="0" flipV="0">
+            <a:off x="8209506" y="2906201"/>
+            <a:ext cx="111123" cy="126999"/>
+          </a:xfrm>
+          <a:prstGeom prst="ellipse">
+            <a:avLst/>
+          </a:prstGeom>
+          <a:solidFill>
+            <a:schemeClr val="accent2">
+              <a:lumMod val="50000"/>
+            </a:schemeClr>
+          </a:solidFill>
+        </p:spPr>
+        <p:style>
+          <a:lnRef idx="2">
+            <a:schemeClr val="accent1">
+              <a:shade val="50000"/>
+            </a:schemeClr>
+          </a:lnRef>
+          <a:fillRef idx="1">
+            <a:schemeClr val="accent1"/>
+          </a:fillRef>
+          <a:effectRef idx="0">
+            <a:schemeClr val="accent1"/>
+          </a:effectRef>
+          <a:fontRef idx="minor">
+            <a:schemeClr val="lt1"/>
+          </a:fontRef>
+        </p:style>
+      </p:sp>
+    </p:spTree>
+  </p:cSld>
+  <p:clrMapOvr>
+    <a:masterClrMapping/>
+  </p:clrMapOvr>
+  <mc:AlternateContent xmlns:mc="http://schemas.openxmlformats.org/markup-compatibility/2006">
+    <mc:Choice xmlns:p14="http://schemas.microsoft.com/office/powerpoint/2010/main" Requires="p14">
+      <p:transition p14:dur="2000" advClick="1"/>
+    </mc:Choice>
+    <mc:Fallback>
+      <p:transition advClick="1"/>
+    </mc:Fallback>
+  </mc:AlternateContent>
+</p:sld>
+</file>
+
+<file path=ppt/slides/slide4.xml><?xml version="1.0" encoding="utf-8"?>
+<p:sld xmlns:a="http://schemas.openxmlformats.org/drawingml/2006/main" xmlns:r="http://schemas.openxmlformats.org/officeDocument/2006/relationships" xmlns:p="http://schemas.openxmlformats.org/presentationml/2006/main" xmlns:m="http://schemas.openxmlformats.org/officeDocument/2006/math" xmlns:w="http://schemas.openxmlformats.org/wordprocessingml/2006/main" showMasterPhAnim="0" show="1">
+  <p:cSld name="">
+    <p:spTree>
+      <p:nvGrpSpPr>
+        <p:cNvPr id="1" name="" hidden="0"/>
+        <p:cNvGrpSpPr/>
+        <p:nvPr isPhoto="0" userDrawn="0"/>
+      </p:nvGrpSpPr>
+      <p:grpSpPr bwMode="auto">
+        <a:xfrm>
+          <a:off x="0" y="0"/>
+          <a:ext cx="0" cy="0"/>
+          <a:chOff x="0" y="0"/>
+          <a:chExt cx="0" cy="0"/>
+        </a:xfrm>
+      </p:grpSpPr>
+      <p:sp>
+        <p:nvSpPr>
+          <p:cNvPr id="4" name="" hidden="0"/>
+          <p:cNvSpPr/>
+          <p:nvPr isPhoto="0" userDrawn="0"/>
+        </p:nvSpPr>
+        <p:spPr bwMode="auto">
+          <a:xfrm>
+            <a:off x="9355844" y="5187592"/>
+            <a:ext cx="254916" cy="365795"/>
+          </a:xfrm>
+        </p:spPr>
+        <p:txBody>
+          <a:bodyPr rot="0" spcFirstLastPara="0" vertOverflow="overflow" horzOverflow="clip" vert="horz" wrap="square" lIns="91440" tIns="45720" rIns="91440" bIns="45720" numCol="1" spcCol="0" rtlCol="0" fromWordArt="0" anchor="t" anchorCtr="0" forceAA="0" upright="0" compatLnSpc="1">
+            <a:prstTxWarp prst="textNoShape"/>
+            <a:spAutoFit/>
+          </a:bodyPr>
+          <a:p>
+            <a:pPr>
+              <a:defRPr/>
+            </a:pPr>
+            <a:endParaRPr/>
+          </a:p>
+        </p:txBody>
+      </p:sp>
+      <p:pic>
+        <p:nvPicPr>
+          <p:cNvPr id="5" name="" hidden="0"/>
+          <p:cNvPicPr>
+            <a:picLocks noChangeAspect="1"/>
+          </p:cNvPicPr>
+          <p:nvPr isPhoto="0" userDrawn="0"/>
+        </p:nvPicPr>
+        <p:blipFill>
+          <a:blip r:embed="rId2"/>
+          <a:stretch/>
+        </p:blipFill>
+        <p:spPr bwMode="auto">
+          <a:xfrm>
+            <a:off x="3387285" y="1877257"/>
+            <a:ext cx="2581274" cy="1295399"/>
+          </a:xfrm>
+          <a:prstGeom prst="rect">
+            <a:avLst/>
+          </a:prstGeom>
+        </p:spPr>
+      </p:pic>
+      <p:pic>
+        <p:nvPicPr>
+          <p:cNvPr id="6" name="" hidden="0"/>
+          <p:cNvPicPr>
+            <a:picLocks noChangeAspect="1"/>
+          </p:cNvPicPr>
+          <p:nvPr isPhoto="0" userDrawn="0"/>
+        </p:nvPicPr>
+        <p:blipFill>
+          <a:blip r:embed="rId3"/>
+          <a:stretch/>
+        </p:blipFill>
+        <p:spPr bwMode="auto">
+          <a:xfrm flipH="1">
+            <a:off x="2366962" y="3300412"/>
+            <a:ext cx="1743075" cy="2619374"/>
+          </a:xfrm>
+          <a:prstGeom prst="rect">
+            <a:avLst/>
+          </a:prstGeom>
+        </p:spPr>
+      </p:pic>
+      <p:sp>
+        <p:nvSpPr>
+          <p:cNvPr id="7" name="" hidden="0"/>
+          <p:cNvSpPr/>
+          <p:nvPr isPhoto="0" userDrawn="0"/>
+        </p:nvSpPr>
+        <p:spPr bwMode="auto">
+          <a:xfrm flipH="0" flipV="0">
+            <a:off x="10350058" y="5568313"/>
+            <a:ext cx="47294" cy="65812"/>
+          </a:xfrm>
+        </p:spPr>
+        <p:txBody>
+          <a:bodyPr rot="0" spcFirstLastPara="0" vertOverflow="overflow" horzOverflow="clip" vert="horz" wrap="square" lIns="91440" tIns="45720" rIns="91440" bIns="45720" numCol="1" spcCol="0" rtlCol="0" fromWordArt="0" anchor="t" anchorCtr="0" forceAA="0" upright="0" compatLnSpc="1">
+            <a:prstTxWarp prst="textNoShape"/>
+            <a:noAutofit/>
+          </a:bodyPr>
+          <a:p>
+            <a:pPr>
+              <a:defRPr/>
+            </a:pPr>
+            <a:endParaRPr/>
+          </a:p>
+        </p:txBody>
+      </p:sp>
+      <p:sp>
+        <p:nvSpPr>
+          <p:cNvPr id="8" name="" hidden="0"/>
+          <p:cNvSpPr/>
+          <p:nvPr isPhoto="0" userDrawn="0"/>
+        </p:nvSpPr>
+        <p:spPr bwMode="auto">
+          <a:xfrm flipH="0" flipV="0">
+            <a:off x="10907759" y="6235065"/>
+            <a:ext cx="47293" cy="65811"/>
+          </a:xfrm>
+        </p:spPr>
+        <p:txBody>
+          <a:bodyPr rot="0" spcFirstLastPara="0" vertOverflow="overflow" horzOverflow="clip" vert="horz" wrap="square" lIns="91440" tIns="45720" rIns="91440" bIns="45720" numCol="1" spcCol="0" rtlCol="0" fromWordArt="0" anchor="t" anchorCtr="0" forceAA="0" upright="0" compatLnSpc="1">
+            <a:prstTxWarp prst="textNoShape"/>
+            <a:noAutofit/>
+          </a:bodyPr>
+          <a:p>
+            <a:pPr>
+              <a:defRPr/>
+            </a:pPr>
+            <a:endParaRPr/>
+          </a:p>
+        </p:txBody>
+      </p:sp>
+      <p:cxnSp>
+        <p:nvCxnSpPr>
+          <p:cNvPr id="9" name="" hidden="0"/>
+          <p:cNvCxnSpPr>
+            <a:cxnSpLocks/>
+          </p:cNvCxnSpPr>
+          <p:nvPr isPhoto="0" userDrawn="0"/>
+        </p:nvCxnSpPr>
+        <p:spPr bwMode="auto">
+          <a:xfrm flipH="1" flipV="1">
+            <a:off x="3449025" y="3400424"/>
+            <a:ext cx="0" cy="247649"/>
+          </a:xfrm>
+          <a:prstGeom prst="line">
+            <a:avLst/>
+          </a:prstGeom>
+          <a:ln w="38099" cap="flat" cmpd="sng" algn="ctr">
+            <a:solidFill>
+              <a:srgbClr val="002060"/>
+            </a:solidFill>
+            <a:prstDash val="solid"/>
+            <a:miter/>
+          </a:ln>
+        </p:spPr>
+        <p:style>
+          <a:lnRef idx="1">
+            <a:schemeClr val="accent1">
+              <a:shade val="50000"/>
+            </a:schemeClr>
+          </a:lnRef>
+          <a:fillRef idx="0">
+            <a:schemeClr val="accent1"/>
+          </a:fillRef>
+          <a:effectRef idx="0">
+            <a:schemeClr val="accent1"/>
+          </a:effectRef>
+          <a:fontRef idx="minor">
+            <a:schemeClr val="tx1"/>
+          </a:fontRef>
+        </p:style>
+      </p:cxnSp>
+      <p:cxnSp>
+        <p:nvCxnSpPr>
+          <p:cNvPr id="10" name="" hidden="0"/>
+          <p:cNvCxnSpPr>
+            <a:cxnSpLocks/>
+            <a:stCxn id="9" idx="1"/>
+          </p:cNvCxnSpPr>
+          <p:nvPr isPhoto="0" userDrawn="0"/>
+        </p:nvCxnSpPr>
+        <p:spPr bwMode="auto">
+          <a:xfrm rot="5399977" flipH="1" flipV="1">
+            <a:off x="6035062" y="766762"/>
+            <a:ext cx="47623" cy="5219699"/>
+          </a:xfrm>
+          <a:prstGeom prst="line">
+            <a:avLst/>
+          </a:prstGeom>
+          <a:ln w="38099" cap="flat" cmpd="sng" algn="ctr">
+            <a:solidFill>
+              <a:srgbClr val="002060"/>
+            </a:solidFill>
+            <a:prstDash val="solid"/>
+            <a:miter/>
+          </a:ln>
+        </p:spPr>
+        <p:style>
+          <a:lnRef idx="1">
+            <a:schemeClr val="accent1">
+              <a:shade val="50000"/>
+            </a:schemeClr>
+          </a:lnRef>
+          <a:fillRef idx="0">
+            <a:schemeClr val="accent1"/>
+          </a:fillRef>
+          <a:effectRef idx="0">
+            <a:schemeClr val="accent1"/>
+          </a:effectRef>
+          <a:fontRef idx="minor">
+            <a:schemeClr val="tx1"/>
+          </a:fontRef>
+        </p:style>
+      </p:cxnSp>
+      <p:cxnSp>
+        <p:nvCxnSpPr>
+          <p:cNvPr id="11" name="" hidden="0"/>
+          <p:cNvCxnSpPr>
+            <a:cxnSpLocks/>
+          </p:cNvCxnSpPr>
+          <p:nvPr isPhoto="0" userDrawn="0"/>
+        </p:nvCxnSpPr>
+        <p:spPr bwMode="auto">
+          <a:xfrm flipH="0" flipV="1">
+            <a:off x="3010874" y="2276474"/>
+            <a:ext cx="0" cy="1371600"/>
+          </a:xfrm>
+          <a:prstGeom prst="line">
+            <a:avLst/>
+          </a:prstGeom>
+          <a:ln w="38099" cap="flat" cmpd="sng" algn="ctr">
+            <a:solidFill>
+              <a:srgbClr val="FF0000"/>
+            </a:solidFill>
+            <a:prstDash val="solid"/>
+            <a:miter/>
+          </a:ln>
+        </p:spPr>
+        <p:style>
+          <a:lnRef idx="1">
+            <a:schemeClr val="accent1">
+              <a:shade val="50000"/>
+            </a:schemeClr>
+          </a:lnRef>
+          <a:fillRef idx="0">
+            <a:schemeClr val="accent1"/>
+          </a:fillRef>
+          <a:effectRef idx="0">
+            <a:schemeClr val="accent1"/>
+          </a:effectRef>
+          <a:fontRef idx="minor">
+            <a:schemeClr val="tx1"/>
+          </a:fontRef>
+        </p:style>
+      </p:cxnSp>
+      <p:cxnSp>
+        <p:nvCxnSpPr>
+          <p:cNvPr id="12" name="" hidden="0"/>
+          <p:cNvCxnSpPr>
+            <a:cxnSpLocks/>
+            <a:stCxn id="11" idx="1"/>
+          </p:cNvCxnSpPr>
+          <p:nvPr isPhoto="0" userDrawn="0"/>
+        </p:nvCxnSpPr>
+        <p:spPr bwMode="auto">
+          <a:xfrm rot="5399977" flipH="1" flipV="1">
+            <a:off x="3696187" y="1585912"/>
+            <a:ext cx="0" cy="1370624"/>
+          </a:xfrm>
+          <a:prstGeom prst="line">
+            <a:avLst/>
+          </a:prstGeom>
+          <a:ln w="38099" cap="flat" cmpd="sng" algn="ctr">
+            <a:solidFill>
+              <a:srgbClr val="FF0000"/>
+            </a:solidFill>
+            <a:prstDash val="solid"/>
+            <a:miter/>
+          </a:ln>
+        </p:spPr>
+        <p:style>
+          <a:lnRef idx="1">
+            <a:schemeClr val="accent1">
+              <a:shade val="50000"/>
+            </a:schemeClr>
+          </a:lnRef>
+          <a:fillRef idx="0">
+            <a:schemeClr val="accent1"/>
+          </a:fillRef>
+          <a:effectRef idx="0">
+            <a:schemeClr val="accent1"/>
+          </a:effectRef>
+          <a:fontRef idx="minor">
+            <a:schemeClr val="tx1"/>
+          </a:fontRef>
+        </p:style>
+      </p:cxnSp>
+      <p:cxnSp>
+        <p:nvCxnSpPr>
+          <p:cNvPr id="13" name="" hidden="0"/>
+          <p:cNvCxnSpPr>
+            <a:cxnSpLocks/>
+          </p:cNvCxnSpPr>
+          <p:nvPr isPhoto="0" userDrawn="0"/>
+        </p:nvCxnSpPr>
+        <p:spPr bwMode="auto">
+          <a:xfrm rot="5399977" flipH="0" flipV="1">
+            <a:off x="7021670" y="595597"/>
+            <a:ext cx="0" cy="3351254"/>
+          </a:xfrm>
+          <a:prstGeom prst="line">
+            <a:avLst/>
+          </a:prstGeom>
+          <a:ln w="38099" cap="flat" cmpd="sng" algn="ctr">
+            <a:solidFill>
+              <a:srgbClr val="FF0000"/>
+            </a:solidFill>
+            <a:prstDash val="solid"/>
+            <a:miter/>
+          </a:ln>
+        </p:spPr>
+        <p:style>
+          <a:lnRef idx="1">
+            <a:schemeClr val="accent1">
+              <a:shade val="50000"/>
+            </a:schemeClr>
+          </a:lnRef>
+          <a:fillRef idx="0">
+            <a:schemeClr val="accent1"/>
+          </a:fillRef>
+          <a:effectRef idx="0">
+            <a:schemeClr val="accent1"/>
+          </a:effectRef>
+          <a:fontRef idx="minor">
+            <a:schemeClr val="tx1"/>
+          </a:fontRef>
+        </p:style>
+      </p:cxnSp>
+      <p:sp>
+        <p:nvSpPr>
+          <p:cNvPr id="14" name="" hidden="0"/>
+          <p:cNvSpPr/>
+          <p:nvPr isPhoto="0" userDrawn="0"/>
+        </p:nvSpPr>
+        <p:spPr bwMode="auto">
+          <a:xfrm flipH="0" flipV="0">
+            <a:off x="16020671" y="7453247"/>
+            <a:ext cx="68702" cy="127651"/>
+          </a:xfrm>
+        </p:spPr>
+        <p:txBody>
+          <a:bodyPr rot="0" spcFirstLastPara="0" vertOverflow="overflow" horzOverflow="clip" vert="horz" wrap="square" lIns="91440" tIns="45720" rIns="91440" bIns="45720" numCol="1" spcCol="0" rtlCol="0" fromWordArt="0" anchor="t" anchorCtr="0" forceAA="0" upright="0" compatLnSpc="1">
+            <a:prstTxWarp prst="textNoShape"/>
+            <a:noAutofit/>
+          </a:bodyPr>
+          <a:p>
+            <a:pPr>
+              <a:defRPr/>
+            </a:pPr>
+            <a:endParaRPr/>
+          </a:p>
+        </p:txBody>
+      </p:sp>
+      <p:pic>
+        <p:nvPicPr>
+          <p:cNvPr id="15" name="" hidden="0"/>
+          <p:cNvPicPr>
+            <a:picLocks noChangeAspect="1"/>
+          </p:cNvPicPr>
+          <p:nvPr isPhoto="0" userDrawn="0"/>
+        </p:nvPicPr>
+        <p:blipFill>
+          <a:blip r:embed="rId4"/>
+          <a:stretch/>
+        </p:blipFill>
+        <p:spPr bwMode="auto">
+          <a:xfrm flipH="0" flipV="0">
+            <a:off x="10052111" y="4161407"/>
+            <a:ext cx="1186641" cy="1655315"/>
+          </a:xfrm>
+          <a:prstGeom prst="rect">
+            <a:avLst/>
+          </a:prstGeom>
+        </p:spPr>
+      </p:pic>
+      <p:cxnSp>
+        <p:nvCxnSpPr>
+          <p:cNvPr id="16" name="" hidden="0"/>
+          <p:cNvCxnSpPr>
+            <a:cxnSpLocks/>
+          </p:cNvCxnSpPr>
+          <p:nvPr isPhoto="0" userDrawn="0"/>
+        </p:nvCxnSpPr>
+        <p:spPr bwMode="auto">
+          <a:xfrm flipH="0" flipV="0">
+            <a:off x="4809684" y="2728033"/>
+            <a:ext cx="0" cy="665825"/>
+          </a:xfrm>
+          <a:prstGeom prst="line">
+            <a:avLst/>
+          </a:prstGeom>
+          <a:ln w="38099" cap="flat" cmpd="sng" algn="ctr">
+            <a:solidFill>
+              <a:srgbClr val="002060"/>
+            </a:solidFill>
+            <a:prstDash val="solid"/>
+            <a:miter/>
+          </a:ln>
+        </p:spPr>
+        <p:style>
+          <a:lnRef idx="1">
+            <a:schemeClr val="accent1">
+              <a:shade val="50000"/>
+            </a:schemeClr>
+          </a:lnRef>
+          <a:fillRef idx="0">
+            <a:schemeClr val="accent1"/>
+          </a:fillRef>
+          <a:effectRef idx="0">
+            <a:schemeClr val="accent1"/>
+          </a:effectRef>
+          <a:fontRef idx="minor">
+            <a:schemeClr val="tx1"/>
+          </a:fontRef>
+        </p:style>
+      </p:cxnSp>
+      <p:sp>
+        <p:nvSpPr>
+          <p:cNvPr id="17" name="" hidden="0"/>
+          <p:cNvSpPr/>
+          <p:nvPr isPhoto="0" userDrawn="0"/>
+        </p:nvSpPr>
+        <p:spPr bwMode="auto">
+          <a:xfrm flipH="0" flipV="0">
+            <a:off x="4754122" y="3299916"/>
+            <a:ext cx="111123" cy="126999"/>
+          </a:xfrm>
+          <a:prstGeom prst="ellipse">
+            <a:avLst/>
+          </a:prstGeom>
+          <a:solidFill>
+            <a:srgbClr val="002060"/>
           </a:solidFill>
         </p:spPr>
         <p:style>

</xml_diff>